<commit_message>
add manager && template static && url
</commit_message>
<xml_diff>
--- a/docs/django2 实战.pptx
+++ b/docs/django2 实战.pptx
@@ -5,7 +5,7 @@
     <p:sldMasterId id="2147483648" r:id="rId1"/>
   </p:sldMasterIdLst>
   <p:notesMasterIdLst>
-    <p:notesMasterId r:id="rId17"/>
+    <p:notesMasterId r:id="rId18"/>
   </p:notesMasterIdLst>
   <p:sldIdLst>
     <p:sldId id="256" r:id="rId2"/>
@@ -23,6 +23,7 @@
     <p:sldId id="275" r:id="rId14"/>
     <p:sldId id="276" r:id="rId15"/>
     <p:sldId id="277" r:id="rId16"/>
+    <p:sldId id="278" r:id="rId17"/>
   </p:sldIdLst>
   <p:sldSz cx="12192000" cy="6858000"/>
   <p:notesSz cx="6858000" cy="9144000"/>
@@ -4888,6 +4889,586 @@
     <p:extLst>
       <p:ext uri="{BB962C8B-B14F-4D97-AF65-F5344CB8AC3E}">
         <p14:creationId xmlns:p14="http://schemas.microsoft.com/office/powerpoint/2010/main" val="1967513926"/>
+      </p:ext>
+    </p:extLst>
+  </p:cSld>
+  <p:clrMapOvr>
+    <a:masterClrMapping/>
+  </p:clrMapOvr>
+  <p:transition spd="med"/>
+  <p:timing>
+    <p:tnLst>
+      <p:par>
+        <p:cTn id="1" dur="indefinite" restart="never" nodeType="tmRoot">
+          <p:childTnLst>
+            <p:seq concurrent="1" nextAc="seek">
+              <p:cTn id="2" dur="indefinite" nodeType="mainSeq">
+                <p:childTnLst>
+                  <p:par>
+                    <p:cTn id="3" fill="hold">
+                      <p:stCondLst>
+                        <p:cond delay="indefinite"/>
+                      </p:stCondLst>
+                      <p:childTnLst>
+                        <p:par>
+                          <p:cTn id="4" fill="hold">
+                            <p:stCondLst>
+                              <p:cond delay="0"/>
+                            </p:stCondLst>
+                            <p:childTnLst>
+                              <p:par>
+                                <p:cTn id="5" presetID="2" presetClass="entr" presetSubtype="4" fill="hold" grpId="0" nodeType="clickEffect">
+                                  <p:stCondLst>
+                                    <p:cond delay="0"/>
+                                  </p:stCondLst>
+                                  <p:iterate>
+                                    <p:tmAbs val="0"/>
+                                  </p:iterate>
+                                  <p:childTnLst>
+                                    <p:set>
+                                      <p:cBhvr>
+                                        <p:cTn id="6" fill="hold"/>
+                                        <p:tgtEl>
+                                          <p:spTgt spid="6"/>
+                                        </p:tgtEl>
+                                        <p:attrNameLst>
+                                          <p:attrName>style.visibility</p:attrName>
+                                        </p:attrNameLst>
+                                      </p:cBhvr>
+                                      <p:to>
+                                        <p:strVal val="visible"/>
+                                      </p:to>
+                                    </p:set>
+                                    <p:anim calcmode="lin" valueType="num">
+                                      <p:cBhvr>
+                                        <p:cTn id="7" dur="500" fill="hold"/>
+                                        <p:tgtEl>
+                                          <p:spTgt spid="6"/>
+                                        </p:tgtEl>
+                                        <p:attrNameLst>
+                                          <p:attrName>ppt_x</p:attrName>
+                                        </p:attrNameLst>
+                                      </p:cBhvr>
+                                      <p:tavLst>
+                                        <p:tav tm="0">
+                                          <p:val>
+                                            <p:strVal val="#ppt_x"/>
+                                          </p:val>
+                                        </p:tav>
+                                        <p:tav tm="100000">
+                                          <p:val>
+                                            <p:strVal val="#ppt_x"/>
+                                          </p:val>
+                                        </p:tav>
+                                      </p:tavLst>
+                                    </p:anim>
+                                    <p:anim calcmode="lin" valueType="num">
+                                      <p:cBhvr>
+                                        <p:cTn id="8" dur="500" fill="hold"/>
+                                        <p:tgtEl>
+                                          <p:spTgt spid="6"/>
+                                        </p:tgtEl>
+                                        <p:attrNameLst>
+                                          <p:attrName>ppt_y</p:attrName>
+                                        </p:attrNameLst>
+                                      </p:cBhvr>
+                                      <p:tavLst>
+                                        <p:tav tm="0">
+                                          <p:val>
+                                            <p:strVal val="1+#ppt_h/2"/>
+                                          </p:val>
+                                        </p:tav>
+                                        <p:tav tm="100000">
+                                          <p:val>
+                                            <p:strVal val="#ppt_y"/>
+                                          </p:val>
+                                        </p:tav>
+                                      </p:tavLst>
+                                    </p:anim>
+                                  </p:childTnLst>
+                                </p:cTn>
+                              </p:par>
+                            </p:childTnLst>
+                          </p:cTn>
+                        </p:par>
+                      </p:childTnLst>
+                    </p:cTn>
+                  </p:par>
+                  <p:par>
+                    <p:cTn id="9" fill="hold">
+                      <p:stCondLst>
+                        <p:cond delay="indefinite"/>
+                      </p:stCondLst>
+                      <p:childTnLst>
+                        <p:par>
+                          <p:cTn id="10" fill="hold">
+                            <p:stCondLst>
+                              <p:cond delay="0"/>
+                            </p:stCondLst>
+                            <p:childTnLst>
+                              <p:par>
+                                <p:cTn id="11" presetID="2" presetClass="entr" presetSubtype="4" fill="hold" grpId="0" nodeType="clickEffect">
+                                  <p:stCondLst>
+                                    <p:cond delay="0"/>
+                                  </p:stCondLst>
+                                  <p:iterate>
+                                    <p:tmAbs val="0"/>
+                                  </p:iterate>
+                                  <p:childTnLst>
+                                    <p:set>
+                                      <p:cBhvr>
+                                        <p:cTn id="12" fill="hold"/>
+                                        <p:tgtEl>
+                                          <p:spTgt spid="5"/>
+                                        </p:tgtEl>
+                                        <p:attrNameLst>
+                                          <p:attrName>style.visibility</p:attrName>
+                                        </p:attrNameLst>
+                                      </p:cBhvr>
+                                      <p:to>
+                                        <p:strVal val="visible"/>
+                                      </p:to>
+                                    </p:set>
+                                    <p:anim calcmode="lin" valueType="num">
+                                      <p:cBhvr>
+                                        <p:cTn id="13" dur="500" fill="hold"/>
+                                        <p:tgtEl>
+                                          <p:spTgt spid="5"/>
+                                        </p:tgtEl>
+                                        <p:attrNameLst>
+                                          <p:attrName>ppt_x</p:attrName>
+                                        </p:attrNameLst>
+                                      </p:cBhvr>
+                                      <p:tavLst>
+                                        <p:tav tm="0">
+                                          <p:val>
+                                            <p:strVal val="#ppt_x"/>
+                                          </p:val>
+                                        </p:tav>
+                                        <p:tav tm="100000">
+                                          <p:val>
+                                            <p:strVal val="#ppt_x"/>
+                                          </p:val>
+                                        </p:tav>
+                                      </p:tavLst>
+                                    </p:anim>
+                                    <p:anim calcmode="lin" valueType="num">
+                                      <p:cBhvr>
+                                        <p:cTn id="14" dur="500" fill="hold"/>
+                                        <p:tgtEl>
+                                          <p:spTgt spid="5"/>
+                                        </p:tgtEl>
+                                        <p:attrNameLst>
+                                          <p:attrName>ppt_y</p:attrName>
+                                        </p:attrNameLst>
+                                      </p:cBhvr>
+                                      <p:tavLst>
+                                        <p:tav tm="0">
+                                          <p:val>
+                                            <p:strVal val="1+#ppt_h/2"/>
+                                          </p:val>
+                                        </p:tav>
+                                        <p:tav tm="100000">
+                                          <p:val>
+                                            <p:strVal val="#ppt_y"/>
+                                          </p:val>
+                                        </p:tav>
+                                      </p:tavLst>
+                                    </p:anim>
+                                  </p:childTnLst>
+                                </p:cTn>
+                              </p:par>
+                            </p:childTnLst>
+                          </p:cTn>
+                        </p:par>
+                      </p:childTnLst>
+                    </p:cTn>
+                  </p:par>
+                  <p:par>
+                    <p:cTn id="15" fill="hold">
+                      <p:stCondLst>
+                        <p:cond delay="indefinite"/>
+                      </p:stCondLst>
+                      <p:childTnLst>
+                        <p:par>
+                          <p:cTn id="16" fill="hold">
+                            <p:stCondLst>
+                              <p:cond delay="0"/>
+                            </p:stCondLst>
+                            <p:childTnLst>
+                              <p:par>
+                                <p:cTn id="17" presetID="2" presetClass="entr" presetSubtype="4" fill="hold" grpId="0" nodeType="clickEffect">
+                                  <p:stCondLst>
+                                    <p:cond delay="0"/>
+                                  </p:stCondLst>
+                                  <p:iterate>
+                                    <p:tmAbs val="0"/>
+                                  </p:iterate>
+                                  <p:childTnLst>
+                                    <p:set>
+                                      <p:cBhvr>
+                                        <p:cTn id="18" fill="hold"/>
+                                        <p:tgtEl>
+                                          <p:spTgt spid="8"/>
+                                        </p:tgtEl>
+                                        <p:attrNameLst>
+                                          <p:attrName>style.visibility</p:attrName>
+                                        </p:attrNameLst>
+                                      </p:cBhvr>
+                                      <p:to>
+                                        <p:strVal val="visible"/>
+                                      </p:to>
+                                    </p:set>
+                                    <p:anim calcmode="lin" valueType="num">
+                                      <p:cBhvr>
+                                        <p:cTn id="19" dur="500" fill="hold"/>
+                                        <p:tgtEl>
+                                          <p:spTgt spid="8"/>
+                                        </p:tgtEl>
+                                        <p:attrNameLst>
+                                          <p:attrName>ppt_x</p:attrName>
+                                        </p:attrNameLst>
+                                      </p:cBhvr>
+                                      <p:tavLst>
+                                        <p:tav tm="0">
+                                          <p:val>
+                                            <p:strVal val="#ppt_x"/>
+                                          </p:val>
+                                        </p:tav>
+                                        <p:tav tm="100000">
+                                          <p:val>
+                                            <p:strVal val="#ppt_x"/>
+                                          </p:val>
+                                        </p:tav>
+                                      </p:tavLst>
+                                    </p:anim>
+                                    <p:anim calcmode="lin" valueType="num">
+                                      <p:cBhvr>
+                                        <p:cTn id="20" dur="500" fill="hold"/>
+                                        <p:tgtEl>
+                                          <p:spTgt spid="8"/>
+                                        </p:tgtEl>
+                                        <p:attrNameLst>
+                                          <p:attrName>ppt_y</p:attrName>
+                                        </p:attrNameLst>
+                                      </p:cBhvr>
+                                      <p:tavLst>
+                                        <p:tav tm="0">
+                                          <p:val>
+                                            <p:strVal val="1+#ppt_h/2"/>
+                                          </p:val>
+                                        </p:tav>
+                                        <p:tav tm="100000">
+                                          <p:val>
+                                            <p:strVal val="#ppt_y"/>
+                                          </p:val>
+                                        </p:tav>
+                                      </p:tavLst>
+                                    </p:anim>
+                                  </p:childTnLst>
+                                </p:cTn>
+                              </p:par>
+                            </p:childTnLst>
+                          </p:cTn>
+                        </p:par>
+                      </p:childTnLst>
+                    </p:cTn>
+                  </p:par>
+                </p:childTnLst>
+              </p:cTn>
+              <p:prevCondLst>
+                <p:cond evt="onPrev" delay="0">
+                  <p:tgtEl>
+                    <p:sldTgt/>
+                  </p:tgtEl>
+                </p:cond>
+              </p:prevCondLst>
+              <p:nextCondLst>
+                <p:cond evt="onNext" delay="0">
+                  <p:tgtEl>
+                    <p:sldTgt/>
+                  </p:tgtEl>
+                </p:cond>
+              </p:nextCondLst>
+            </p:seq>
+          </p:childTnLst>
+        </p:cTn>
+      </p:par>
+    </p:tnLst>
+    <p:bldLst>
+      <p:bldP spid="5" grpId="0" animBg="1" advAuto="0"/>
+      <p:bldP spid="6" grpId="0" animBg="1" advAuto="0"/>
+      <p:bldP spid="8" grpId="0" animBg="1" advAuto="0"/>
+    </p:bldLst>
+  </p:timing>
+</p:sld>
+</file>
+
+<file path=ppt/slides/slide16.xml><?xml version="1.0" encoding="utf-8"?>
+<p:sld xmlns:a="http://schemas.openxmlformats.org/drawingml/2006/main" xmlns:r="http://schemas.openxmlformats.org/officeDocument/2006/relationships" xmlns:p="http://schemas.openxmlformats.org/presentationml/2006/main">
+  <p:cSld>
+    <p:spTree>
+      <p:nvGrpSpPr>
+        <p:cNvPr id="1" name=""/>
+        <p:cNvGrpSpPr/>
+        <p:nvPr/>
+      </p:nvGrpSpPr>
+      <p:grpSpPr>
+        <a:xfrm>
+          <a:off x="0" y="0"/>
+          <a:ext cx="0" cy="0"/>
+          <a:chOff x="0" y="0"/>
+          <a:chExt cx="0" cy="0"/>
+        </a:xfrm>
+      </p:grpSpPr>
+      <p:sp>
+        <p:nvSpPr>
+          <p:cNvPr id="5" name="矩形"/>
+          <p:cNvSpPr txBox="1"/>
+          <p:nvPr/>
+        </p:nvSpPr>
+        <p:spPr>
+          <a:xfrm>
+            <a:off x="543222" y="2963730"/>
+            <a:ext cx="8565283" cy="400105"/>
+          </a:xfrm>
+          <a:prstGeom prst="rect">
+            <a:avLst/>
+          </a:prstGeom>
+          <a:ln w="12700">
+            <a:miter lim="400000"/>
+          </a:ln>
+          <a:extLst>
+            <a:ext uri="{C572A759-6A51-4108-AA02-DFA0A04FC94B}">
+              <ma14:wrappingTextBoxFlag xmlns:ma14="http://schemas.microsoft.com/office/mac/drawingml/2011/main" val="1"/>
+            </a:ext>
+          </a:extLst>
+        </p:spPr>
+        <p:txBody>
+          <a:bodyPr lIns="45718" tIns="45718" rIns="45718" bIns="45718" anchor="ctr">
+            <a:spAutoFit/>
+          </a:bodyPr>
+          <a:lstStyle/>
+          <a:p>
+            <a:pPr marL="800100" lvl="1" indent="-342900">
+              <a:buSzPct val="100000"/>
+              <a:buChar char="◆"/>
+              <a:defRPr sz="2000">
+                <a:solidFill>
+                  <a:srgbClr val="474747"/>
+                </a:solidFill>
+                <a:latin typeface="Microsoft YaHei"/>
+                <a:ea typeface="Microsoft YaHei"/>
+                <a:cs typeface="Microsoft YaHei"/>
+                <a:sym typeface="Microsoft YaHei"/>
+              </a:defRPr>
+            </a:pPr>
+            <a:r>
+              <a:rPr lang="en-US" altLang="zh-CN" dirty="0" err="1">
+                <a:hlinkClick r:id="rId2"/>
+              </a:rPr>
+              <a:t>rest_framework</a:t>
+            </a:r>
+            <a:endParaRPr dirty="0">
+              <a:solidFill>
+                <a:srgbClr val="CB3747"/>
+              </a:solidFill>
+            </a:endParaRPr>
+          </a:p>
+        </p:txBody>
+      </p:sp>
+      <p:sp>
+        <p:nvSpPr>
+          <p:cNvPr id="6" name="矩形"/>
+          <p:cNvSpPr txBox="1"/>
+          <p:nvPr/>
+        </p:nvSpPr>
+        <p:spPr>
+          <a:xfrm>
+            <a:off x="539549" y="2211711"/>
+            <a:ext cx="8565283" cy="400105"/>
+          </a:xfrm>
+          <a:prstGeom prst="rect">
+            <a:avLst/>
+          </a:prstGeom>
+          <a:ln w="12700">
+            <a:miter lim="400000"/>
+          </a:ln>
+          <a:extLst>
+            <a:ext uri="{C572A759-6A51-4108-AA02-DFA0A04FC94B}">
+              <ma14:wrappingTextBoxFlag xmlns:ma14="http://schemas.microsoft.com/office/mac/drawingml/2011/main" val="1"/>
+            </a:ext>
+          </a:extLst>
+        </p:spPr>
+        <p:txBody>
+          <a:bodyPr lIns="45718" tIns="45718" rIns="45718" bIns="45718" anchor="ctr">
+            <a:spAutoFit/>
+          </a:bodyPr>
+          <a:lstStyle/>
+          <a:p>
+            <a:pPr marL="800100" lvl="1" indent="-342900">
+              <a:buSzPct val="100000"/>
+              <a:buChar char="◆"/>
+              <a:defRPr sz="2000">
+                <a:solidFill>
+                  <a:srgbClr val="474747"/>
+                </a:solidFill>
+                <a:latin typeface="Microsoft YaHei"/>
+                <a:ea typeface="Microsoft YaHei"/>
+                <a:cs typeface="Microsoft YaHei"/>
+                <a:sym typeface="Microsoft YaHei"/>
+              </a:defRPr>
+            </a:pPr>
+            <a:r>
+              <a:rPr lang="en-US" altLang="zh-CN" sz="2000" dirty="0" smtClean="0">
+                <a:sym typeface="Microsoft YaHei"/>
+              </a:rPr>
+              <a:t>FBV</a:t>
+            </a:r>
+            <a:r>
+              <a:rPr lang="zh-CN" altLang="en-US" sz="2000" dirty="0" smtClean="0">
+                <a:sym typeface="Microsoft YaHei"/>
+              </a:rPr>
+              <a:t>、</a:t>
+            </a:r>
+            <a:r>
+              <a:rPr lang="en-US" altLang="zh-CN" sz="2000" dirty="0" smtClean="0">
+                <a:sym typeface="Microsoft YaHei"/>
+                <a:hlinkClick r:id="rId3"/>
+              </a:rPr>
+              <a:t>CBV</a:t>
+            </a:r>
+            <a:endParaRPr dirty="0">
+              <a:solidFill>
+                <a:srgbClr val="CB3747"/>
+              </a:solidFill>
+            </a:endParaRPr>
+          </a:p>
+        </p:txBody>
+      </p:sp>
+      <p:sp>
+        <p:nvSpPr>
+          <p:cNvPr id="7" name="矩形"/>
+          <p:cNvSpPr txBox="1"/>
+          <p:nvPr/>
+        </p:nvSpPr>
+        <p:spPr>
+          <a:xfrm>
+            <a:off x="5316907" y="369769"/>
+            <a:ext cx="1631212" cy="553994"/>
+          </a:xfrm>
+          <a:prstGeom prst="rect">
+            <a:avLst/>
+          </a:prstGeom>
+          <a:ln w="12700">
+            <a:miter lim="400000"/>
+          </a:ln>
+          <a:extLst>
+            <a:ext uri="{C572A759-6A51-4108-AA02-DFA0A04FC94B}">
+              <ma14:wrappingTextBoxFlag xmlns:ma14="http://schemas.microsoft.com/office/mac/drawingml/2011/main" val="1"/>
+            </a:ext>
+          </a:extLst>
+        </p:spPr>
+        <p:txBody>
+          <a:bodyPr wrap="none" lIns="45718" tIns="45718" rIns="45718" bIns="45718">
+            <a:spAutoFit/>
+          </a:bodyPr>
+          <a:lstStyle>
+            <a:lvl1pPr>
+              <a:defRPr sz="3000">
+                <a:solidFill>
+                  <a:srgbClr val="C9394A"/>
+                </a:solidFill>
+                <a:latin typeface="Microsoft YaHei"/>
+                <a:ea typeface="Microsoft YaHei"/>
+                <a:cs typeface="Microsoft YaHei"/>
+                <a:sym typeface="Microsoft YaHei"/>
+              </a:defRPr>
+            </a:lvl1pPr>
+          </a:lstStyle>
+          <a:p>
+            <a:r>
+              <a:rPr lang="zh-CN" altLang="en-US" dirty="0" smtClean="0"/>
+              <a:t>课程总结</a:t>
+            </a:r>
+            <a:endParaRPr dirty="0"/>
+          </a:p>
+        </p:txBody>
+      </p:sp>
+      <p:sp>
+        <p:nvSpPr>
+          <p:cNvPr id="8" name="矩形"/>
+          <p:cNvSpPr txBox="1"/>
+          <p:nvPr/>
+        </p:nvSpPr>
+        <p:spPr>
+          <a:xfrm>
+            <a:off x="539549" y="3715749"/>
+            <a:ext cx="8565283" cy="400105"/>
+          </a:xfrm>
+          <a:prstGeom prst="rect">
+            <a:avLst/>
+          </a:prstGeom>
+          <a:ln w="12700">
+            <a:miter lim="400000"/>
+          </a:ln>
+          <a:extLst>
+            <a:ext uri="{C572A759-6A51-4108-AA02-DFA0A04FC94B}">
+              <ma14:wrappingTextBoxFlag xmlns:ma14="http://schemas.microsoft.com/office/mac/drawingml/2011/main" val="1"/>
+            </a:ext>
+          </a:extLst>
+        </p:spPr>
+        <p:txBody>
+          <a:bodyPr lIns="45718" tIns="45718" rIns="45718" bIns="45718" anchor="ctr">
+            <a:spAutoFit/>
+          </a:bodyPr>
+          <a:lstStyle/>
+          <a:p>
+            <a:pPr marL="800100" lvl="1" indent="-342900">
+              <a:buSzPct val="100000"/>
+              <a:buChar char="◆"/>
+              <a:defRPr sz="2000">
+                <a:solidFill>
+                  <a:srgbClr val="474747"/>
+                </a:solidFill>
+                <a:latin typeface="Microsoft YaHei"/>
+                <a:ea typeface="Microsoft YaHei"/>
+                <a:cs typeface="Microsoft YaHei"/>
+                <a:sym typeface="Microsoft YaHei"/>
+              </a:defRPr>
+            </a:pPr>
+            <a:r>
+              <a:rPr lang="en-US" altLang="zh-CN" sz="2000" dirty="0" err="1" smtClean="0">
+                <a:sym typeface="Microsoft YaHei"/>
+                <a:hlinkClick r:id="rId4"/>
+              </a:rPr>
+              <a:t>VueJS</a:t>
+            </a:r>
+            <a:r>
+              <a:rPr lang="en-US" altLang="zh-CN" sz="2000" dirty="0" smtClean="0">
+                <a:sym typeface="Microsoft YaHei"/>
+              </a:rPr>
+              <a:t>/</a:t>
+            </a:r>
+            <a:r>
+              <a:rPr lang="en-US" altLang="zh-CN" sz="2000" dirty="0" smtClean="0">
+                <a:sym typeface="Microsoft YaHei"/>
+                <a:hlinkClick r:id="rId5"/>
+              </a:rPr>
+              <a:t>React</a:t>
+            </a:r>
+            <a:endParaRPr dirty="0">
+              <a:solidFill>
+                <a:srgbClr val="CB3747"/>
+              </a:solidFill>
+            </a:endParaRPr>
+          </a:p>
+        </p:txBody>
+      </p:sp>
+    </p:spTree>
+    <p:extLst>
+      <p:ext uri="{BB962C8B-B14F-4D97-AF65-F5344CB8AC3E}">
+        <p14:creationId xmlns:p14="http://schemas.microsoft.com/office/powerpoint/2010/main" val="1365180540"/>
       </p:ext>
     </p:extLst>
   </p:cSld>

</xml_diff>